<commit_message>
ArrayFire and Boost study
</commit_message>
<xml_diff>
--- a/Personal Study/Note.pptx
+++ b/Personal Study/Note.pptx
@@ -1436,7 +1436,7 @@
           <a:bodyPr lIns="0" rIns="0" tIns="0" bIns="0"/>
           <a:p>
             <a:pPr algn="r"/>
-            <a:fld id="{ACFF5A4D-795D-4A74-98F2-79BB25118820}" type="slidenum">
+            <a:fld id="{E71EF504-6DEE-40AB-A270-8576329D579C}" type="slidenum">
               <a:rPr lang="en-GB" sz="1400">
                 <a:latin typeface="Times New Roman"/>
               </a:rPr>
@@ -1589,33 +1589,6 @@
       </p:sp>
     </p:spTree>
   </p:cSld>
-  <p:timing>
-    <p:tnLst>
-      <p:par>
-        <p:cTn id="1" dur="indefinite" restart="never" nodeType="tmRoot">
-          <p:childTnLst>
-            <p:seq>
-              <p:cTn id="2" nodeType="mainSeq"/>
-              <p:prevCondLst>
-                <p:cond delay="0" evt="onPrev">
-                  <p:tgtEl>
-                    <p:sldTgt/>
-                  </p:tgtEl>
-                </p:cond>
-              </p:prevCondLst>
-              <p:nextCondLst>
-                <p:cond delay="0" evt="onNext">
-                  <p:tgtEl>
-                    <p:sldTgt/>
-                  </p:tgtEl>
-                </p:cond>
-              </p:nextCondLst>
-            </p:seq>
-          </p:childTnLst>
-        </p:cTn>
-      </p:par>
-    </p:tnLst>
-  </p:timing>
 </p:sld>
 </file>
 
@@ -1714,33 +1687,6 @@
       </p:sp>
     </p:spTree>
   </p:cSld>
-  <p:timing>
-    <p:tnLst>
-      <p:par>
-        <p:cTn id="3" dur="indefinite" restart="never" nodeType="tmRoot">
-          <p:childTnLst>
-            <p:seq>
-              <p:cTn id="4" nodeType="mainSeq"/>
-              <p:prevCondLst>
-                <p:cond delay="0" evt="onPrev">
-                  <p:tgtEl>
-                    <p:sldTgt/>
-                  </p:tgtEl>
-                </p:cond>
-              </p:prevCondLst>
-              <p:nextCondLst>
-                <p:cond delay="0" evt="onNext">
-                  <p:tgtEl>
-                    <p:sldTgt/>
-                  </p:tgtEl>
-                </p:cond>
-              </p:nextCondLst>
-            </p:seq>
-          </p:childTnLst>
-        </p:cTn>
-      </p:par>
-    </p:tnLst>
-  </p:timing>
 </p:sld>
 </file>
 
@@ -1853,33 +1799,6 @@
       </p:sp>
     </p:spTree>
   </p:cSld>
-  <p:timing>
-    <p:tnLst>
-      <p:par>
-        <p:cTn id="5" dur="indefinite" restart="never" nodeType="tmRoot">
-          <p:childTnLst>
-            <p:seq>
-              <p:cTn id="6" nodeType="mainSeq"/>
-              <p:prevCondLst>
-                <p:cond delay="0" evt="onPrev">
-                  <p:tgtEl>
-                    <p:sldTgt/>
-                  </p:tgtEl>
-                </p:cond>
-              </p:prevCondLst>
-              <p:nextCondLst>
-                <p:cond delay="0" evt="onNext">
-                  <p:tgtEl>
-                    <p:sldTgt/>
-                  </p:tgtEl>
-                </p:cond>
-              </p:nextCondLst>
-            </p:seq>
-          </p:childTnLst>
-        </p:cTn>
-      </p:par>
-    </p:tnLst>
-  </p:timing>
 </p:sld>
 </file>
 
@@ -2070,33 +1989,6 @@
       </p:sp>
     </p:spTree>
   </p:cSld>
-  <p:timing>
-    <p:tnLst>
-      <p:par>
-        <p:cTn id="7" dur="indefinite" restart="never" nodeType="tmRoot">
-          <p:childTnLst>
-            <p:seq>
-              <p:cTn id="8" nodeType="mainSeq"/>
-              <p:prevCondLst>
-                <p:cond delay="0" evt="onPrev">
-                  <p:tgtEl>
-                    <p:sldTgt/>
-                  </p:tgtEl>
-                </p:cond>
-              </p:prevCondLst>
-              <p:nextCondLst>
-                <p:cond delay="0" evt="onNext">
-                  <p:tgtEl>
-                    <p:sldTgt/>
-                  </p:tgtEl>
-                </p:cond>
-              </p:nextCondLst>
-            </p:seq>
-          </p:childTnLst>
-        </p:cTn>
-      </p:par>
-    </p:tnLst>
-  </p:timing>
 </p:sld>
 </file>
 
@@ -2247,33 +2139,6 @@
       </p:sp>
     </p:spTree>
   </p:cSld>
-  <p:timing>
-    <p:tnLst>
-      <p:par>
-        <p:cTn id="9" dur="indefinite" restart="never" nodeType="tmRoot">
-          <p:childTnLst>
-            <p:seq>
-              <p:cTn id="10" nodeType="mainSeq"/>
-              <p:prevCondLst>
-                <p:cond delay="0" evt="onPrev">
-                  <p:tgtEl>
-                    <p:sldTgt/>
-                  </p:tgtEl>
-                </p:cond>
-              </p:prevCondLst>
-              <p:nextCondLst>
-                <p:cond delay="0" evt="onNext">
-                  <p:tgtEl>
-                    <p:sldTgt/>
-                  </p:tgtEl>
-                </p:cond>
-              </p:nextCondLst>
-            </p:seq>
-          </p:childTnLst>
-        </p:cTn>
-      </p:par>
-    </p:tnLst>
-  </p:timing>
 </p:sld>
 </file>
 
@@ -2350,13 +2215,7 @@
               <a:rPr lang="en-GB" sz="3200">
                 <a:latin typeface="Arial"/>
               </a:rPr>
-              <a:t>Types of barrier operations for a </a:t>
-            </a:r>
-            <a:r>
-              <a:rPr lang="en-GB" sz="3200">
-                <a:latin typeface="Arial"/>
-              </a:rPr>
-              <a:t>command queue.</a:t>
+              <a:t>Types of barrier operations for a command queue.</a:t>
             </a:r>
             <a:endParaRPr/>
           </a:p>
@@ -2416,33 +2275,6 @@
       </p:sp>
     </p:spTree>
   </p:cSld>
-  <p:timing>
-    <p:tnLst>
-      <p:par>
-        <p:cTn id="11" dur="indefinite" restart="never" nodeType="tmRoot">
-          <p:childTnLst>
-            <p:seq>
-              <p:cTn id="12" nodeType="mainSeq"/>
-              <p:prevCondLst>
-                <p:cond delay="0" evt="onPrev">
-                  <p:tgtEl>
-                    <p:sldTgt/>
-                  </p:tgtEl>
-                </p:cond>
-              </p:prevCondLst>
-              <p:nextCondLst>
-                <p:cond delay="0" evt="onNext">
-                  <p:tgtEl>
-                    <p:sldTgt/>
-                  </p:tgtEl>
-                </p:cond>
-              </p:nextCondLst>
-            </p:seq>
-          </p:childTnLst>
-        </p:cTn>
-      </p:par>
-    </p:tnLst>
-  </p:timing>
 </p:sld>
 </file>
 
@@ -2634,33 +2466,6 @@
       </p:sp>
     </p:spTree>
   </p:cSld>
-  <p:timing>
-    <p:tnLst>
-      <p:par>
-        <p:cTn id="13" dur="indefinite" restart="never" nodeType="tmRoot">
-          <p:childTnLst>
-            <p:seq>
-              <p:cTn id="14" nodeType="mainSeq"/>
-              <p:prevCondLst>
-                <p:cond delay="0" evt="onPrev">
-                  <p:tgtEl>
-                    <p:sldTgt/>
-                  </p:tgtEl>
-                </p:cond>
-              </p:prevCondLst>
-              <p:nextCondLst>
-                <p:cond delay="0" evt="onNext">
-                  <p:tgtEl>
-                    <p:sldTgt/>
-                  </p:tgtEl>
-                </p:cond>
-              </p:nextCondLst>
-            </p:seq>
-          </p:childTnLst>
-        </p:cTn>
-      </p:par>
-    </p:tnLst>
-  </p:timing>
 </p:sld>
 </file>
 
@@ -2797,33 +2602,6 @@
       </p:sp>
     </p:spTree>
   </p:cSld>
-  <p:timing>
-    <p:tnLst>
-      <p:par>
-        <p:cTn id="15" dur="indefinite" restart="never" nodeType="tmRoot">
-          <p:childTnLst>
-            <p:seq>
-              <p:cTn id="16" nodeType="mainSeq"/>
-              <p:prevCondLst>
-                <p:cond delay="0" evt="onPrev">
-                  <p:tgtEl>
-                    <p:sldTgt/>
-                  </p:tgtEl>
-                </p:cond>
-              </p:prevCondLst>
-              <p:nextCondLst>
-                <p:cond delay="0" evt="onNext">
-                  <p:tgtEl>
-                    <p:sldTgt/>
-                  </p:tgtEl>
-                </p:cond>
-              </p:nextCondLst>
-            </p:seq>
-          </p:childTnLst>
-        </p:cTn>
-      </p:par>
-    </p:tnLst>
-  </p:timing>
 </p:sld>
 </file>
 

</xml_diff>